<commit_message>
spike: gradient and turbo-add-shape mode
</commit_message>
<xml_diff>
--- a/features/steps/test_files/dml-fill.pptx
+++ b/features/steps/test_files/dml-fill.pptx
@@ -142,7 +142,7 @@
           <a:p>
             <a:fld id="{3DF9C8FC-F9EA-5744-843B-4AB6B5A5B009}" type="datetimeFigureOut">
               <a:rPr lang="en-US" smtClean="0"/>
-              <a:t>10/19/17</a:t>
+              <a:t>6/16/18</a:t>
             </a:fld>
             <a:endParaRPr lang="en-US"/>
           </a:p>
@@ -355,7 +355,7 @@
           <a:p>
             <a:fld id="{3DF9C8FC-F9EA-5744-843B-4AB6B5A5B009}" type="datetimeFigureOut">
               <a:rPr lang="en-US" smtClean="0"/>
-              <a:t>10/19/17</a:t>
+              <a:t>6/16/18</a:t>
             </a:fld>
             <a:endParaRPr lang="en-US"/>
           </a:p>
@@ -764,13 +764,80 @@
       </p:sp>
       <p:sp>
         <p:nvSpPr>
+          <p:cNvPr id="9" name="Rounded Rectangle 8"/>
+          <p:cNvSpPr/>
+          <p:nvPr/>
+        </p:nvSpPr>
+        <p:spPr>
+          <a:xfrm>
+            <a:off x="2171101" y="457200"/>
+            <a:ext cx="1368245" cy="914400"/>
+          </a:xfrm>
+          <a:prstGeom prst="roundRect">
+            <a:avLst/>
+          </a:prstGeom>
+          <a:noFill/>
+        </p:spPr>
+        <p:style>
+          <a:lnRef idx="1">
+            <a:schemeClr val="accent1"/>
+          </a:lnRef>
+          <a:fillRef idx="3">
+            <a:schemeClr val="accent1"/>
+          </a:fillRef>
+          <a:effectRef idx="2">
+            <a:schemeClr val="accent1"/>
+          </a:effectRef>
+          <a:fontRef idx="minor">
+            <a:schemeClr val="lt1"/>
+          </a:fontRef>
+        </p:style>
+        <p:txBody>
+          <a:bodyPr rtlCol="0" anchor="ctr"/>
+          <a:lstStyle/>
+          <a:p>
+            <a:pPr algn="ctr"/>
+            <a:r>
+              <a:rPr lang="en-US" sz="1200" dirty="0" smtClean="0">
+                <a:solidFill>
+                  <a:schemeClr val="tx2"/>
+                </a:solidFill>
+              </a:rPr>
+              <a:t>autoshape with </a:t>
+            </a:r>
+            <a:r>
+              <a:rPr lang="en-US" sz="1200" dirty="0" smtClean="0">
+                <a:solidFill>
+                  <a:schemeClr val="tx2"/>
+                </a:solidFill>
+              </a:rPr>
+              <a:t>no </a:t>
+            </a:r>
+            <a:r>
+              <a:rPr lang="en-US" sz="1200" dirty="0" smtClean="0">
+                <a:solidFill>
+                  <a:schemeClr val="tx2"/>
+                </a:solidFill>
+              </a:rPr>
+              <a:t>fill</a:t>
+            </a:r>
+            <a:endParaRPr lang="en-US" sz="1200" dirty="0">
+              <a:solidFill>
+                <a:schemeClr val="tx2"/>
+              </a:solidFill>
+            </a:endParaRPr>
+          </a:p>
+        </p:txBody>
+      </p:sp>
+      <p:sp>
+        <p:nvSpPr>
           <p:cNvPr id="6" name="Rounded Rectangle 5"/>
           <p:cNvSpPr/>
           <p:nvPr/>
         </p:nvSpPr>
         <p:spPr>
           <a:xfrm>
-            <a:off x="2291174" y="457200"/>
+            <a:off x="3885002" y="457200"/>
             <a:ext cx="1368245" cy="914400"/>
           </a:xfrm>
           <a:prstGeom prst="roundRect">
@@ -815,7 +882,7 @@
         </p:nvSpPr>
         <p:spPr>
           <a:xfrm>
-            <a:off x="4114800" y="457200"/>
+            <a:off x="5598903" y="457200"/>
             <a:ext cx="1368245" cy="914400"/>
           </a:xfrm>
           <a:prstGeom prst="roundRect">
@@ -854,6 +921,170 @@
                 </a:solidFill>
               </a:rPr>
               <a:t>autoshape with blip fill</a:t>
+            </a:r>
+            <a:endParaRPr lang="en-US" sz="1200" dirty="0">
+              <a:solidFill>
+                <a:schemeClr val="tx2"/>
+              </a:solidFill>
+            </a:endParaRPr>
+          </a:p>
+        </p:txBody>
+      </p:sp>
+      <p:sp>
+        <p:nvSpPr>
+          <p:cNvPr id="8" name="Rounded Rectangle 7"/>
+          <p:cNvSpPr/>
+          <p:nvPr/>
+        </p:nvSpPr>
+        <p:spPr>
+          <a:xfrm>
+            <a:off x="7312802" y="457200"/>
+            <a:ext cx="1368245" cy="914400"/>
+          </a:xfrm>
+          <a:prstGeom prst="roundRect">
+            <a:avLst/>
+          </a:prstGeom>
+          <a:gradFill flip="none" rotWithShape="1">
+            <a:gsLst>
+              <a:gs pos="0">
+                <a:schemeClr val="accent1">
+                  <a:shade val="51000"/>
+                  <a:satMod val="130000"/>
+                </a:schemeClr>
+              </a:gs>
+              <a:gs pos="55000">
+                <a:schemeClr val="accent1">
+                  <a:shade val="93000"/>
+                  <a:satMod val="130000"/>
+                </a:schemeClr>
+              </a:gs>
+              <a:gs pos="100000">
+                <a:schemeClr val="accent1">
+                  <a:lumMod val="60000"/>
+                  <a:lumOff val="40000"/>
+                </a:schemeClr>
+              </a:gs>
+            </a:gsLst>
+            <a:lin ang="0" scaled="1"/>
+            <a:tileRect/>
+          </a:gradFill>
+        </p:spPr>
+        <p:style>
+          <a:lnRef idx="1">
+            <a:schemeClr val="accent1"/>
+          </a:lnRef>
+          <a:fillRef idx="3">
+            <a:schemeClr val="accent1"/>
+          </a:fillRef>
+          <a:effectRef idx="2">
+            <a:schemeClr val="accent1"/>
+          </a:effectRef>
+          <a:fontRef idx="minor">
+            <a:schemeClr val="lt1"/>
+          </a:fontRef>
+        </p:style>
+        <p:txBody>
+          <a:bodyPr rtlCol="0" anchor="ctr"/>
+          <a:lstStyle/>
+          <a:p>
+            <a:pPr algn="ctr"/>
+            <a:r>
+              <a:rPr lang="en-US" sz="1200" dirty="0" smtClean="0">
+                <a:solidFill>
+                  <a:schemeClr val="bg1"/>
+                </a:solidFill>
+              </a:rPr>
+              <a:t>autoshape with </a:t>
+            </a:r>
+            <a:r>
+              <a:rPr lang="en-US" sz="1200" dirty="0" smtClean="0">
+                <a:solidFill>
+                  <a:schemeClr val="bg1"/>
+                </a:solidFill>
+              </a:rPr>
+              <a:t>gradient </a:t>
+            </a:r>
+            <a:r>
+              <a:rPr lang="en-US" sz="1200" dirty="0" smtClean="0">
+                <a:solidFill>
+                  <a:schemeClr val="bg1"/>
+                </a:solidFill>
+              </a:rPr>
+              <a:t>fill</a:t>
+            </a:r>
+            <a:endParaRPr lang="en-US" sz="1200" dirty="0">
+              <a:solidFill>
+                <a:schemeClr val="bg1"/>
+              </a:solidFill>
+            </a:endParaRPr>
+          </a:p>
+        </p:txBody>
+      </p:sp>
+      <p:sp>
+        <p:nvSpPr>
+          <p:cNvPr id="10" name="Rounded Rectangle 9"/>
+          <p:cNvSpPr/>
+          <p:nvPr/>
+        </p:nvSpPr>
+        <p:spPr>
+          <a:xfrm>
+            <a:off x="457200" y="1836780"/>
+            <a:ext cx="1368245" cy="914400"/>
+          </a:xfrm>
+          <a:prstGeom prst="roundRect">
+            <a:avLst/>
+          </a:prstGeom>
+          <a:pattFill prst="divot">
+            <a:fgClr>
+              <a:srgbClr val="2CB731"/>
+            </a:fgClr>
+            <a:bgClr>
+              <a:prstClr val="white"/>
+            </a:bgClr>
+          </a:pattFill>
+        </p:spPr>
+        <p:style>
+          <a:lnRef idx="1">
+            <a:schemeClr val="accent1"/>
+          </a:lnRef>
+          <a:fillRef idx="3">
+            <a:schemeClr val="accent1"/>
+          </a:fillRef>
+          <a:effectRef idx="2">
+            <a:schemeClr val="accent1"/>
+          </a:effectRef>
+          <a:fontRef idx="minor">
+            <a:schemeClr val="lt1"/>
+          </a:fontRef>
+        </p:style>
+        <p:txBody>
+          <a:bodyPr rtlCol="0" anchor="ctr"/>
+          <a:lstStyle/>
+          <a:p>
+            <a:pPr algn="ctr"/>
+            <a:r>
+              <a:rPr lang="en-US" sz="1200" dirty="0" smtClean="0">
+                <a:solidFill>
+                  <a:schemeClr val="tx2"/>
+                </a:solidFill>
+              </a:rPr>
+              <a:t>autoshape with </a:t>
+            </a:r>
+            <a:r>
+              <a:rPr lang="en-US" sz="1200" dirty="0" smtClean="0">
+                <a:solidFill>
+                  <a:schemeClr val="tx2"/>
+                </a:solidFill>
+              </a:rPr>
+              <a:t>patterned </a:t>
+            </a:r>
+            <a:r>
+              <a:rPr lang="en-US" sz="1200" dirty="0" smtClean="0">
+                <a:solidFill>
+                  <a:schemeClr val="tx2"/>
+                </a:solidFill>
+              </a:rPr>
+              <a:t>fill</a:t>
             </a:r>
             <a:endParaRPr lang="en-US" sz="1200" dirty="0">
               <a:solidFill>
@@ -1050,23 +1281,7 @@
                   <a:schemeClr val="tx2"/>
                 </a:solidFill>
               </a:rPr>
-              <a:t>autoshape with </a:t>
-            </a:r>
-            <a:r>
-              <a:rPr lang="en-US" sz="1200" dirty="0" smtClean="0">
-                <a:solidFill>
-                  <a:schemeClr val="tx2"/>
-                </a:solidFill>
-              </a:rPr>
-              <a:t>Wave pattern </a:t>
-            </a:r>
-            <a:r>
-              <a:rPr lang="en-US" sz="1200" dirty="0" smtClean="0">
-                <a:solidFill>
-                  <a:schemeClr val="tx2"/>
-                </a:solidFill>
-              </a:rPr>
-              <a:t>fill</a:t>
+              <a:t>autoshape with Wave pattern fill</a:t>
             </a:r>
             <a:endParaRPr lang="en-US" sz="1200" dirty="0">
               <a:solidFill>

</xml_diff>